<commit_message>
FAB-11840 Developing Apps: Transaction Handlers
Change-Id: Ief3184a168f748beb25fbea76c2d418dd631e592
Signed-off-by: Anthony O'Dowd <a_o-dowd@uk.ibm.com>
</commit_message>
<xml_diff>
--- a/docs/source/developapps/diagrams.pptx
+++ b/docs/source/developapps/diagrams.pptx
@@ -5,14 +5,15 @@
     <p:sldMasterId id="2147483648" r:id="rId1"/>
   </p:sldMasterIdLst>
   <p:notesMasterIdLst>
-    <p:notesMasterId r:id="rId7"/>
+    <p:notesMasterId r:id="rId8"/>
   </p:notesMasterIdLst>
   <p:sldIdLst>
     <p:sldId id="256" r:id="rId2"/>
     <p:sldId id="257" r:id="rId3"/>
     <p:sldId id="411" r:id="rId4"/>
-    <p:sldId id="412" r:id="rId5"/>
-    <p:sldId id="413" r:id="rId6"/>
+    <p:sldId id="414" r:id="rId5"/>
+    <p:sldId id="412" r:id="rId6"/>
+    <p:sldId id="413" r:id="rId7"/>
   </p:sldIdLst>
   <p:sldSz cx="12192000" cy="6858000"/>
   <p:notesSz cx="6858000" cy="9144000"/>
@@ -600,6 +601,72 @@
     </p:spTree>
     <p:extLst>
       <p:ext uri="{BB962C8B-B14F-4D97-AF65-F5344CB8AC3E}">
+        <p14:creationId xmlns:p14="http://schemas.microsoft.com/office/powerpoint/2010/main" val="3986200529"/>
+      </p:ext>
+    </p:extLst>
+  </p:cSld>
+  <p:clrMapOvr>
+    <a:masterClrMapping/>
+  </p:clrMapOvr>
+</p:notes>
+</file>
+
+<file path=ppt/notesSlides/notesSlide3.xml><?xml version="1.0" encoding="utf-8"?>
+<p:notes xmlns:a="http://schemas.openxmlformats.org/drawingml/2006/main" xmlns:r="http://schemas.openxmlformats.org/officeDocument/2006/relationships" xmlns:p="http://schemas.openxmlformats.org/presentationml/2006/main">
+  <p:cSld>
+    <p:spTree>
+      <p:nvGrpSpPr>
+        <p:cNvPr id="1" name=""/>
+        <p:cNvGrpSpPr/>
+        <p:nvPr/>
+      </p:nvGrpSpPr>
+      <p:grpSpPr>
+        <a:xfrm>
+          <a:off x="0" y="0"/>
+          <a:ext cx="0" cy="0"/>
+          <a:chOff x="0" y="0"/>
+          <a:chExt cx="0" cy="0"/>
+        </a:xfrm>
+      </p:grpSpPr>
+      <p:sp>
+        <p:nvSpPr>
+          <p:cNvPr id="2" name="Slide Image Placeholder 1"/>
+          <p:cNvSpPr>
+            <a:spLocks noGrp="1" noRot="1" noChangeAspect="1"/>
+          </p:cNvSpPr>
+          <p:nvPr>
+            <p:ph type="sldImg"/>
+          </p:nvPr>
+        </p:nvSpPr>
+        <p:spPr>
+          <a:xfrm>
+            <a:off x="381000" y="685800"/>
+            <a:ext cx="6096000" cy="3429000"/>
+          </a:xfrm>
+        </p:spPr>
+      </p:sp>
+      <p:sp>
+        <p:nvSpPr>
+          <p:cNvPr id="3" name="Notes Placeholder 2"/>
+          <p:cNvSpPr>
+            <a:spLocks noGrp="1"/>
+          </p:cNvSpPr>
+          <p:nvPr>
+            <p:ph type="body" idx="1"/>
+          </p:nvPr>
+        </p:nvSpPr>
+        <p:spPr/>
+        <p:txBody>
+          <a:bodyPr/>
+          <a:lstStyle/>
+          <a:p>
+            <a:endParaRPr lang="en-US" dirty="0"/>
+          </a:p>
+        </p:txBody>
+      </p:sp>
+    </p:spTree>
+    <p:extLst>
+      <p:ext uri="{BB962C8B-B14F-4D97-AF65-F5344CB8AC3E}">
         <p14:creationId xmlns:p14="http://schemas.microsoft.com/office/powerpoint/2010/main" val="4038897272"/>
       </p:ext>
     </p:extLst>
@@ -2105,7 +2172,7 @@
           </a:ln>
           <a:extLst>
             <a:ext uri="{C572A759-6A51-4108-AA02-DFA0A04FC94B}">
-              <ma14:wrappingTextBoxFlag xmlns:ma14="http://schemas.microsoft.com/office/mac/drawingml/2011/main" xmlns="" val="1"/>
+              <ma14:wrappingTextBoxFlag xmlns="" xmlns:ma14="http://schemas.microsoft.com/office/mac/drawingml/2011/main" val="1"/>
             </a:ext>
           </a:extLst>
         </p:spPr>
@@ -2144,7 +2211,7 @@
           </a:ln>
           <a:extLst>
             <a:ext uri="{C572A759-6A51-4108-AA02-DFA0A04FC94B}">
-              <ma14:wrappingTextBoxFlag xmlns:ma14="http://schemas.microsoft.com/office/mac/drawingml/2011/main" xmlns="" val="1"/>
+              <ma14:wrappingTextBoxFlag xmlns="" xmlns:ma14="http://schemas.microsoft.com/office/mac/drawingml/2011/main" val="1"/>
             </a:ext>
           </a:extLst>
         </p:spPr>
@@ -3215,7 +3282,7 @@
           </a:prstGeom>
           <a:extLst>
             <a:ext uri="{C572A759-6A51-4108-AA02-DFA0A04FC94B}">
-              <ma14:wrappingTextBoxFlag xmlns:ma14="http://schemas.microsoft.com/office/mac/drawingml/2011/main" xmlns="" val="1"/>
+              <ma14:wrappingTextBoxFlag xmlns="" xmlns:ma14="http://schemas.microsoft.com/office/mac/drawingml/2011/main" val="1"/>
             </a:ext>
           </a:extLst>
         </p:spPr>
@@ -3325,7 +3392,7 @@
           </a:ln>
           <a:extLst>
             <a:ext uri="{C572A759-6A51-4108-AA02-DFA0A04FC94B}">
-              <ma14:wrappingTextBoxFlag xmlns:ma14="http://schemas.microsoft.com/office/mac/drawingml/2011/main" xmlns="" val="1"/>
+              <ma14:wrappingTextBoxFlag xmlns="" xmlns:ma14="http://schemas.microsoft.com/office/mac/drawingml/2011/main" val="1"/>
             </a:ext>
           </a:extLst>
         </p:spPr>
@@ -5637,7 +5704,7 @@
           </a:ln>
           <a:extLst>
             <a:ext uri="{C572A759-6A51-4108-AA02-DFA0A04FC94B}">
-              <ma14:wrappingTextBoxFlag xmlns:ma14="http://schemas.microsoft.com/office/mac/drawingml/2011/main" xmlns="" val="1"/>
+              <ma14:wrappingTextBoxFlag xmlns="" xmlns:ma14="http://schemas.microsoft.com/office/mac/drawingml/2011/main" val="1"/>
             </a:ext>
           </a:extLst>
         </p:spPr>
@@ -5912,6 +5979,1354 @@
             <a:pPr hangingPunct="1"/>
             <a:r>
               <a:rPr lang="en-US" sz="3600" dirty="0"/>
+              <a:t>Diagram 2 – Transaction handlers</a:t>
+            </a:r>
+          </a:p>
+        </p:txBody>
+      </p:sp>
+      <p:sp>
+        <p:nvSpPr>
+          <p:cNvPr id="88" name="Rectangle 87">
+            <a:extLst>
+              <a:ext uri="{FF2B5EF4-FFF2-40B4-BE49-F238E27FC236}">
+                <a16:creationId xmlns:a16="http://schemas.microsoft.com/office/drawing/2014/main" id="{223A95D4-D0D7-9E46-B169-01BEA0CECCEF}"/>
+              </a:ext>
+            </a:extLst>
+          </p:cNvPr>
+          <p:cNvSpPr/>
+          <p:nvPr/>
+        </p:nvSpPr>
+        <p:spPr>
+          <a:xfrm>
+            <a:off x="5869351" y="2049881"/>
+            <a:ext cx="4893386" cy="3827533"/>
+          </a:xfrm>
+          <a:prstGeom prst="rect">
+            <a:avLst/>
+          </a:prstGeom>
+          <a:solidFill>
+            <a:srgbClr val="FFFFFF"/>
+          </a:solidFill>
+          <a:ln w="12700" cap="flat">
+            <a:solidFill>
+              <a:schemeClr val="tx1"/>
+            </a:solidFill>
+            <a:prstDash val="solid"/>
+            <a:miter lim="800000"/>
+          </a:ln>
+          <a:effectLst/>
+          <a:sp3d/>
+        </p:spPr>
+        <p:style>
+          <a:lnRef idx="0">
+            <a:scrgbClr r="0" g="0" b="0"/>
+          </a:lnRef>
+          <a:fillRef idx="0">
+            <a:scrgbClr r="0" g="0" b="0"/>
+          </a:fillRef>
+          <a:effectRef idx="0">
+            <a:scrgbClr r="0" g="0" b="0"/>
+          </a:effectRef>
+          <a:fontRef idx="none"/>
+        </p:style>
+        <p:txBody>
+          <a:bodyPr rot="0" spcFirstLastPara="1" vertOverflow="overflow" horzOverflow="overflow" vert="horz" wrap="square" lIns="144000" tIns="45719" rIns="45719" bIns="45719" numCol="1" spcCol="38100" rtlCol="0" fromWordArt="0" anchor="ctr" anchorCtr="0" forceAA="0" compatLnSpc="1">
+            <a:prstTxWarp prst="textNoShape">
+              <a:avLst/>
+            </a:prstTxWarp>
+            <a:noAutofit/>
+          </a:bodyPr>
+          <a:lstStyle/>
+          <a:p>
+            <a:r>
+              <a:rPr lang="en-US" sz="1400" dirty="0" err="1">
+                <a:latin typeface="Courier New" panose="02070309020205020404" pitchFamily="49" charset="0"/>
+                <a:cs typeface="Courier New" panose="02070309020205020404" pitchFamily="49" charset="0"/>
+              </a:rPr>
+              <a:t>CommercialPaperContract</a:t>
+            </a:r>
+            <a:r>
+              <a:rPr lang="en-US" sz="1400" dirty="0">
+                <a:latin typeface="Courier New" panose="02070309020205020404" pitchFamily="49" charset="0"/>
+                <a:cs typeface="Courier New" panose="02070309020205020404" pitchFamily="49" charset="0"/>
+              </a:rPr>
+              <a:t> extends Contract {</a:t>
+            </a:r>
+          </a:p>
+          <a:p>
+            <a:endParaRPr lang="en-US" sz="1400" dirty="0">
+              <a:latin typeface="Courier New" panose="02070309020205020404" pitchFamily="49" charset="0"/>
+              <a:cs typeface="Courier New" panose="02070309020205020404" pitchFamily="49" charset="0"/>
+            </a:endParaRPr>
+          </a:p>
+          <a:p>
+            <a:pPr lvl="1"/>
+            <a:r>
+              <a:rPr lang="en-US" sz="1400" dirty="0">
+                <a:latin typeface="Courier New" panose="02070309020205020404" pitchFamily="49" charset="0"/>
+                <a:cs typeface="Courier New" panose="02070309020205020404" pitchFamily="49" charset="0"/>
+              </a:rPr>
+              <a:t>issue(</a:t>
+            </a:r>
+            <a:r>
+              <a:rPr lang="en-US" sz="1400" dirty="0" err="1">
+                <a:latin typeface="Courier New" panose="02070309020205020404" pitchFamily="49" charset="0"/>
+                <a:cs typeface="Courier New" panose="02070309020205020404" pitchFamily="49" charset="0"/>
+              </a:rPr>
+              <a:t>ctx</a:t>
+            </a:r>
+            <a:r>
+              <a:rPr lang="en-US" sz="1400" dirty="0">
+                <a:latin typeface="Courier New" panose="02070309020205020404" pitchFamily="49" charset="0"/>
+                <a:cs typeface="Courier New" panose="02070309020205020404" pitchFamily="49" charset="0"/>
+              </a:rPr>
+              <a:t>, issuer, </a:t>
+            </a:r>
+            <a:r>
+              <a:rPr lang="en-US" sz="1400" dirty="0" err="1">
+                <a:latin typeface="Courier New" panose="02070309020205020404" pitchFamily="49" charset="0"/>
+                <a:cs typeface="Courier New" panose="02070309020205020404" pitchFamily="49" charset="0"/>
+              </a:rPr>
+              <a:t>paperNumber</a:t>
+            </a:r>
+            <a:r>
+              <a:rPr lang="en-US" sz="1400" dirty="0">
+                <a:latin typeface="Courier New" panose="02070309020205020404" pitchFamily="49" charset="0"/>
+                <a:cs typeface="Courier New" panose="02070309020205020404" pitchFamily="49" charset="0"/>
+              </a:rPr>
+              <a:t>, ...) { </a:t>
+            </a:r>
+          </a:p>
+          <a:p>
+            <a:pPr lvl="1"/>
+            <a:r>
+              <a:rPr lang="en-US" sz="1400" dirty="0">
+                <a:latin typeface="Courier New" panose="02070309020205020404" pitchFamily="49" charset="0"/>
+                <a:cs typeface="Courier New" panose="02070309020205020404" pitchFamily="49" charset="0"/>
+              </a:rPr>
+              <a:t> </a:t>
+            </a:r>
+          </a:p>
+          <a:p>
+            <a:pPr lvl="1"/>
+            <a:r>
+              <a:rPr lang="en-US" sz="1400" dirty="0">
+                <a:latin typeface="Courier New" panose="02070309020205020404" pitchFamily="49" charset="0"/>
+                <a:cs typeface="Courier New" panose="02070309020205020404" pitchFamily="49" charset="0"/>
+              </a:rPr>
+              <a:t>   return result;</a:t>
+            </a:r>
+          </a:p>
+          <a:p>
+            <a:pPr lvl="1"/>
+            <a:r>
+              <a:rPr lang="en-US" sz="1400" dirty="0">
+                <a:latin typeface="Courier New" panose="02070309020205020404" pitchFamily="49" charset="0"/>
+                <a:cs typeface="Courier New" panose="02070309020205020404" pitchFamily="49" charset="0"/>
+              </a:rPr>
+              <a:t>}</a:t>
+            </a:r>
+          </a:p>
+          <a:p>
+            <a:pPr lvl="1"/>
+            <a:endParaRPr lang="en-US" sz="1400" dirty="0">
+              <a:latin typeface="Courier New" panose="02070309020205020404" pitchFamily="49" charset="0"/>
+              <a:cs typeface="Courier New" panose="02070309020205020404" pitchFamily="49" charset="0"/>
+            </a:endParaRPr>
+          </a:p>
+          <a:p>
+            <a:pPr lvl="1"/>
+            <a:r>
+              <a:rPr lang="en-US" sz="1400" dirty="0">
+                <a:latin typeface="Courier New" panose="02070309020205020404" pitchFamily="49" charset="0"/>
+                <a:cs typeface="Courier New" panose="02070309020205020404" pitchFamily="49" charset="0"/>
+              </a:rPr>
+              <a:t>buy(</a:t>
+            </a:r>
+            <a:r>
+              <a:rPr lang="en-US" sz="1400" dirty="0" err="1">
+                <a:latin typeface="Courier New" panose="02070309020205020404" pitchFamily="49" charset="0"/>
+                <a:cs typeface="Courier New" panose="02070309020205020404" pitchFamily="49" charset="0"/>
+              </a:rPr>
+              <a:t>ctx</a:t>
+            </a:r>
+            <a:r>
+              <a:rPr lang="en-US" sz="1400" dirty="0">
+                <a:latin typeface="Courier New" panose="02070309020205020404" pitchFamily="49" charset="0"/>
+                <a:cs typeface="Courier New" panose="02070309020205020404" pitchFamily="49" charset="0"/>
+              </a:rPr>
+              <a:t>, issuer, </a:t>
+            </a:r>
+            <a:r>
+              <a:rPr lang="en-US" sz="1400" dirty="0" err="1">
+                <a:latin typeface="Courier New" panose="02070309020205020404" pitchFamily="49" charset="0"/>
+                <a:cs typeface="Courier New" panose="02070309020205020404" pitchFamily="49" charset="0"/>
+              </a:rPr>
+              <a:t>paperNumber</a:t>
+            </a:r>
+            <a:r>
+              <a:rPr lang="en-US" sz="1400" dirty="0">
+                <a:latin typeface="Courier New" panose="02070309020205020404" pitchFamily="49" charset="0"/>
+                <a:cs typeface="Courier New" panose="02070309020205020404" pitchFamily="49" charset="0"/>
+              </a:rPr>
+              <a:t>, ...) {</a:t>
+            </a:r>
+          </a:p>
+          <a:p>
+            <a:pPr lvl="1"/>
+            <a:endParaRPr lang="en-US" sz="1400" dirty="0">
+              <a:latin typeface="Courier New" panose="02070309020205020404" pitchFamily="49" charset="0"/>
+              <a:cs typeface="Courier New" panose="02070309020205020404" pitchFamily="49" charset="0"/>
+            </a:endParaRPr>
+          </a:p>
+          <a:p>
+            <a:pPr lvl="1"/>
+            <a:r>
+              <a:rPr lang="en-US" sz="1400" dirty="0">
+                <a:latin typeface="Courier New" panose="02070309020205020404" pitchFamily="49" charset="0"/>
+                <a:cs typeface="Courier New" panose="02070309020205020404" pitchFamily="49" charset="0"/>
+              </a:rPr>
+              <a:t>    ...</a:t>
+            </a:r>
+          </a:p>
+          <a:p>
+            <a:pPr lvl="1"/>
+            <a:r>
+              <a:rPr lang="en-US" sz="1400" dirty="0">
+                <a:latin typeface="Courier New" panose="02070309020205020404" pitchFamily="49" charset="0"/>
+                <a:cs typeface="Courier New" panose="02070309020205020404" pitchFamily="49" charset="0"/>
+              </a:rPr>
+              <a:t>}</a:t>
+            </a:r>
+          </a:p>
+          <a:p>
+            <a:pPr lvl="1"/>
+            <a:endParaRPr lang="en-US" sz="1400" dirty="0">
+              <a:latin typeface="Courier New" panose="02070309020205020404" pitchFamily="49" charset="0"/>
+              <a:cs typeface="Courier New" panose="02070309020205020404" pitchFamily="49" charset="0"/>
+            </a:endParaRPr>
+          </a:p>
+          <a:p>
+            <a:pPr lvl="1"/>
+            <a:r>
+              <a:rPr lang="en-US" sz="1400" dirty="0">
+                <a:latin typeface="Courier New" panose="02070309020205020404" pitchFamily="49" charset="0"/>
+                <a:cs typeface="Courier New" panose="02070309020205020404" pitchFamily="49" charset="0"/>
+              </a:rPr>
+              <a:t>redeem(</a:t>
+            </a:r>
+            <a:r>
+              <a:rPr lang="en-US" sz="1400" dirty="0" err="1">
+                <a:latin typeface="Courier New" panose="02070309020205020404" pitchFamily="49" charset="0"/>
+                <a:cs typeface="Courier New" panose="02070309020205020404" pitchFamily="49" charset="0"/>
+              </a:rPr>
+              <a:t>ctx</a:t>
+            </a:r>
+            <a:r>
+              <a:rPr lang="en-US" sz="1400" dirty="0">
+                <a:latin typeface="Courier New" panose="02070309020205020404" pitchFamily="49" charset="0"/>
+                <a:cs typeface="Courier New" panose="02070309020205020404" pitchFamily="49" charset="0"/>
+              </a:rPr>
+              <a:t>, issuer, </a:t>
+            </a:r>
+            <a:r>
+              <a:rPr lang="en-US" sz="1400" dirty="0" err="1">
+                <a:latin typeface="Courier New" panose="02070309020205020404" pitchFamily="49" charset="0"/>
+                <a:cs typeface="Courier New" panose="02070309020205020404" pitchFamily="49" charset="0"/>
+              </a:rPr>
+              <a:t>paperNumber</a:t>
+            </a:r>
+            <a:r>
+              <a:rPr lang="en-US" sz="1400" dirty="0">
+                <a:latin typeface="Courier New" panose="02070309020205020404" pitchFamily="49" charset="0"/>
+                <a:cs typeface="Courier New" panose="02070309020205020404" pitchFamily="49" charset="0"/>
+              </a:rPr>
+              <a:t>, ...) {</a:t>
+            </a:r>
+          </a:p>
+          <a:p>
+            <a:pPr lvl="1"/>
+            <a:endParaRPr lang="en-US" sz="1400" dirty="0">
+              <a:latin typeface="Courier New" panose="02070309020205020404" pitchFamily="49" charset="0"/>
+              <a:cs typeface="Courier New" panose="02070309020205020404" pitchFamily="49" charset="0"/>
+            </a:endParaRPr>
+          </a:p>
+          <a:p>
+            <a:pPr lvl="1"/>
+            <a:r>
+              <a:rPr lang="en-US" sz="1400" dirty="0">
+                <a:latin typeface="Courier New" panose="02070309020205020404" pitchFamily="49" charset="0"/>
+                <a:cs typeface="Courier New" panose="02070309020205020404" pitchFamily="49" charset="0"/>
+              </a:rPr>
+              <a:t>    ...</a:t>
+            </a:r>
+          </a:p>
+          <a:p>
+            <a:pPr lvl="1"/>
+            <a:r>
+              <a:rPr lang="en-US" sz="1400" dirty="0">
+                <a:latin typeface="Courier New" panose="02070309020205020404" pitchFamily="49" charset="0"/>
+                <a:cs typeface="Courier New" panose="02070309020205020404" pitchFamily="49" charset="0"/>
+              </a:rPr>
+              <a:t>}</a:t>
+            </a:r>
+          </a:p>
+          <a:p>
+            <a:r>
+              <a:rPr lang="en-US" sz="1400" dirty="0">
+                <a:latin typeface="Courier New" panose="02070309020205020404" pitchFamily="49" charset="0"/>
+                <a:cs typeface="Courier New" panose="02070309020205020404" pitchFamily="49" charset="0"/>
+              </a:rPr>
+              <a:t>}</a:t>
+            </a:r>
+          </a:p>
+        </p:txBody>
+      </p:sp>
+      <p:grpSp>
+        <p:nvGrpSpPr>
+          <p:cNvPr id="19" name="Group 18">
+            <a:extLst>
+              <a:ext uri="{FF2B5EF4-FFF2-40B4-BE49-F238E27FC236}">
+                <a16:creationId xmlns:a16="http://schemas.microsoft.com/office/drawing/2014/main" id="{04703A59-D1F3-F745-9A1F-9145189530E5}"/>
+              </a:ext>
+            </a:extLst>
+          </p:cNvPr>
+          <p:cNvGrpSpPr/>
+          <p:nvPr/>
+        </p:nvGrpSpPr>
+        <p:grpSpPr>
+          <a:xfrm>
+            <a:off x="5444460" y="2695242"/>
+            <a:ext cx="915155" cy="637329"/>
+            <a:chOff x="5533284" y="2695242"/>
+            <a:chExt cx="733927" cy="637329"/>
+          </a:xfrm>
+        </p:grpSpPr>
+        <p:cxnSp>
+          <p:nvCxnSpPr>
+            <p:cNvPr id="3" name="Straight Arrow Connector 2">
+              <a:extLst>
+                <a:ext uri="{FF2B5EF4-FFF2-40B4-BE49-F238E27FC236}">
+                  <a16:creationId xmlns:a16="http://schemas.microsoft.com/office/drawing/2014/main" id="{5487343C-2E20-2447-A17A-32EB088DD70B}"/>
+                </a:ext>
+              </a:extLst>
+            </p:cNvPr>
+            <p:cNvCxnSpPr>
+              <a:cxnSpLocks/>
+              <a:stCxn id="5" idx="1"/>
+            </p:cNvCxnSpPr>
+            <p:nvPr/>
+          </p:nvCxnSpPr>
+          <p:spPr>
+            <a:xfrm>
+              <a:off x="5533285" y="2695242"/>
+              <a:ext cx="733926" cy="0"/>
+            </a:xfrm>
+            <a:prstGeom prst="straightConnector1">
+              <a:avLst/>
+            </a:prstGeom>
+            <a:noFill/>
+            <a:ln w="12700" cap="flat">
+              <a:solidFill>
+                <a:schemeClr val="tx1"/>
+              </a:solidFill>
+              <a:prstDash val="solid"/>
+              <a:miter lim="800000"/>
+              <a:tailEnd type="triangle"/>
+            </a:ln>
+            <a:effectLst/>
+            <a:sp3d/>
+          </p:spPr>
+          <p:style>
+            <a:lnRef idx="0">
+              <a:scrgbClr r="0" g="0" b="0"/>
+            </a:lnRef>
+            <a:fillRef idx="0">
+              <a:scrgbClr r="0" g="0" b="0"/>
+            </a:fillRef>
+            <a:effectRef idx="0">
+              <a:scrgbClr r="0" g="0" b="0"/>
+            </a:effectRef>
+            <a:fontRef idx="none"/>
+          </p:style>
+        </p:cxnSp>
+        <p:cxnSp>
+          <p:nvCxnSpPr>
+            <p:cNvPr id="29" name="Straight Arrow Connector 28">
+              <a:extLst>
+                <a:ext uri="{FF2B5EF4-FFF2-40B4-BE49-F238E27FC236}">
+                  <a16:creationId xmlns:a16="http://schemas.microsoft.com/office/drawing/2014/main" id="{BF0A9AD3-9A84-8944-AB03-2BB687B23AA9}"/>
+                </a:ext>
+              </a:extLst>
+            </p:cNvPr>
+            <p:cNvCxnSpPr>
+              <a:cxnSpLocks/>
+              <a:stCxn id="32" idx="1"/>
+            </p:cNvCxnSpPr>
+            <p:nvPr/>
+          </p:nvCxnSpPr>
+          <p:spPr>
+            <a:xfrm>
+              <a:off x="5533284" y="3332571"/>
+              <a:ext cx="733926" cy="0"/>
+            </a:xfrm>
+            <a:prstGeom prst="straightConnector1">
+              <a:avLst/>
+            </a:prstGeom>
+            <a:noFill/>
+            <a:ln w="12700" cap="flat">
+              <a:solidFill>
+                <a:schemeClr val="tx1"/>
+              </a:solidFill>
+              <a:prstDash val="solid"/>
+              <a:miter lim="800000"/>
+              <a:headEnd type="triangle"/>
+              <a:tailEnd type="none"/>
+            </a:ln>
+            <a:effectLst/>
+            <a:sp3d/>
+          </p:spPr>
+          <p:style>
+            <a:lnRef idx="0">
+              <a:scrgbClr r="0" g="0" b="0"/>
+            </a:lnRef>
+            <a:fillRef idx="0">
+              <a:scrgbClr r="0" g="0" b="0"/>
+            </a:fillRef>
+            <a:effectRef idx="0">
+              <a:scrgbClr r="0" g="0" b="0"/>
+            </a:effectRef>
+            <a:fontRef idx="none"/>
+          </p:style>
+        </p:cxnSp>
+      </p:grpSp>
+      <p:sp>
+        <p:nvSpPr>
+          <p:cNvPr id="5" name="TextBox 4">
+            <a:extLst>
+              <a:ext uri="{FF2B5EF4-FFF2-40B4-BE49-F238E27FC236}">
+                <a16:creationId xmlns:a16="http://schemas.microsoft.com/office/drawing/2014/main" id="{2028D91D-6D71-C443-9B2D-9E5572588916}"/>
+              </a:ext>
+            </a:extLst>
+          </p:cNvPr>
+          <p:cNvSpPr txBox="1"/>
+          <p:nvPr/>
+        </p:nvSpPr>
+        <p:spPr>
+          <a:xfrm flipH="1">
+            <a:off x="2446643" y="2541354"/>
+            <a:ext cx="3071960" cy="307775"/>
+          </a:xfrm>
+          <a:prstGeom prst="rect">
+            <a:avLst/>
+          </a:prstGeom>
+          <a:solidFill>
+            <a:srgbClr val="FFFFFF"/>
+          </a:solidFill>
+          <a:ln w="12700" cap="flat">
+            <a:solidFill>
+              <a:schemeClr val="tx1"/>
+            </a:solidFill>
+            <a:prstDash val="solid"/>
+            <a:miter lim="800000"/>
+          </a:ln>
+          <a:effectLst/>
+          <a:sp3d/>
+        </p:spPr>
+        <p:style>
+          <a:lnRef idx="0">
+            <a:scrgbClr r="0" g="0" b="0"/>
+          </a:lnRef>
+          <a:fillRef idx="0">
+            <a:scrgbClr r="0" g="0" b="0"/>
+          </a:fillRef>
+          <a:effectRef idx="0">
+            <a:scrgbClr r="0" g="0" b="0"/>
+          </a:effectRef>
+          <a:fontRef idx="none"/>
+        </p:style>
+        <p:txBody>
+          <a:bodyPr rot="0" spcFirstLastPara="1" vertOverflow="overflow" horzOverflow="overflow" vert="horz" wrap="square" lIns="144000" tIns="45719" rIns="45719" bIns="45719" numCol="1" spcCol="38100" rtlCol="0" fromWordArt="0" anchor="ctr" anchorCtr="0" forceAA="0" compatLnSpc="1">
+            <a:prstTxWarp prst="textNoShape">
+              <a:avLst/>
+            </a:prstTxWarp>
+            <a:noAutofit/>
+          </a:bodyPr>
+          <a:lstStyle>
+            <a:defPPr marL="0" marR="0" indent="0" algn="l" defTabSz="914400" rtl="0" fontAlgn="auto" latinLnBrk="1" hangingPunct="0">
+              <a:lnSpc>
+                <a:spcPct val="100000"/>
+              </a:lnSpc>
+              <a:spcBef>
+                <a:spcPts val="0"/>
+              </a:spcBef>
+              <a:spcAft>
+                <a:spcPts val="0"/>
+              </a:spcAft>
+              <a:buClrTx/>
+              <a:buSzTx/>
+              <a:buFontTx/>
+              <a:buNone/>
+              <a:tabLst/>
+              <a:defRPr kumimoji="0" sz="1800" b="0" i="0" u="none" strike="noStrike" cap="none" spc="0" normalizeH="0" baseline="0">
+                <a:ln>
+                  <a:noFill/>
+                </a:ln>
+                <a:solidFill>
+                  <a:srgbClr val="000000"/>
+                </a:solidFill>
+                <a:effectLst/>
+                <a:uFillTx/>
+              </a:defRPr>
+            </a:defPPr>
+            <a:lvl1pPr>
+              <a:defRPr sz="1400">
+                <a:latin typeface="Courier New" panose="02070309020205020404" pitchFamily="49" charset="0"/>
+                <a:cs typeface="Courier New" panose="02070309020205020404" pitchFamily="49" charset="0"/>
+              </a:defRPr>
+            </a:lvl1pPr>
+            <a:lvl2pPr lvl="1">
+              <a:defRPr sz="1400">
+                <a:latin typeface="Courier New" panose="02070309020205020404" pitchFamily="49" charset="0"/>
+                <a:cs typeface="Courier New" panose="02070309020205020404" pitchFamily="49" charset="0"/>
+              </a:defRPr>
+            </a:lvl2pPr>
+          </a:lstStyle>
+          <a:p>
+            <a:r>
+              <a:rPr lang="en-US" dirty="0" err="1"/>
+              <a:t>beforeFunction</a:t>
+            </a:r>
+            <a:r>
+              <a:rPr lang="en-US" dirty="0"/>
+              <a:t>(</a:t>
+            </a:r>
+            <a:r>
+              <a:rPr lang="en-US" dirty="0" err="1"/>
+              <a:t>ctx</a:t>
+            </a:r>
+            <a:r>
+              <a:rPr lang="en-US" dirty="0"/>
+              <a:t>) </a:t>
+            </a:r>
+          </a:p>
+        </p:txBody>
+      </p:sp>
+      <p:sp>
+        <p:nvSpPr>
+          <p:cNvPr id="32" name="TextBox 31">
+            <a:extLst>
+              <a:ext uri="{FF2B5EF4-FFF2-40B4-BE49-F238E27FC236}">
+                <a16:creationId xmlns:a16="http://schemas.microsoft.com/office/drawing/2014/main" id="{83E37CED-3BE1-5941-B242-E7341C3464EF}"/>
+              </a:ext>
+            </a:extLst>
+          </p:cNvPr>
+          <p:cNvSpPr txBox="1"/>
+          <p:nvPr/>
+        </p:nvSpPr>
+        <p:spPr>
+          <a:xfrm flipH="1">
+            <a:off x="2446642" y="3178683"/>
+            <a:ext cx="3071960" cy="307775"/>
+          </a:xfrm>
+          <a:prstGeom prst="rect">
+            <a:avLst/>
+          </a:prstGeom>
+          <a:solidFill>
+            <a:srgbClr val="FFFFFF"/>
+          </a:solidFill>
+          <a:ln w="12700" cap="flat">
+            <a:solidFill>
+              <a:schemeClr val="tx1"/>
+            </a:solidFill>
+            <a:prstDash val="solid"/>
+            <a:miter lim="800000"/>
+          </a:ln>
+          <a:effectLst/>
+          <a:sp3d/>
+        </p:spPr>
+        <p:style>
+          <a:lnRef idx="0">
+            <a:scrgbClr r="0" g="0" b="0"/>
+          </a:lnRef>
+          <a:fillRef idx="0">
+            <a:scrgbClr r="0" g="0" b="0"/>
+          </a:fillRef>
+          <a:effectRef idx="0">
+            <a:scrgbClr r="0" g="0" b="0"/>
+          </a:effectRef>
+          <a:fontRef idx="none"/>
+        </p:style>
+        <p:txBody>
+          <a:bodyPr rot="0" spcFirstLastPara="1" vertOverflow="overflow" horzOverflow="overflow" vert="horz" wrap="square" lIns="144000" tIns="45719" rIns="45719" bIns="45719" numCol="1" spcCol="38100" rtlCol="0" fromWordArt="0" anchor="ctr" anchorCtr="0" forceAA="0" compatLnSpc="1">
+            <a:prstTxWarp prst="textNoShape">
+              <a:avLst/>
+            </a:prstTxWarp>
+            <a:noAutofit/>
+          </a:bodyPr>
+          <a:lstStyle>
+            <a:defPPr marL="0" marR="0" indent="0" algn="l" defTabSz="914400" rtl="0" fontAlgn="auto" latinLnBrk="1" hangingPunct="0">
+              <a:lnSpc>
+                <a:spcPct val="100000"/>
+              </a:lnSpc>
+              <a:spcBef>
+                <a:spcPts val="0"/>
+              </a:spcBef>
+              <a:spcAft>
+                <a:spcPts val="0"/>
+              </a:spcAft>
+              <a:buClrTx/>
+              <a:buSzTx/>
+              <a:buFontTx/>
+              <a:buNone/>
+              <a:tabLst/>
+              <a:defRPr kumimoji="0" sz="1800" b="0" i="0" u="none" strike="noStrike" cap="none" spc="0" normalizeH="0" baseline="0">
+                <a:ln>
+                  <a:noFill/>
+                </a:ln>
+                <a:solidFill>
+                  <a:srgbClr val="000000"/>
+                </a:solidFill>
+                <a:effectLst/>
+                <a:uFillTx/>
+              </a:defRPr>
+            </a:defPPr>
+            <a:lvl1pPr>
+              <a:defRPr sz="1400">
+                <a:latin typeface="Courier New" panose="02070309020205020404" pitchFamily="49" charset="0"/>
+                <a:cs typeface="Courier New" panose="02070309020205020404" pitchFamily="49" charset="0"/>
+              </a:defRPr>
+            </a:lvl1pPr>
+            <a:lvl2pPr lvl="1">
+              <a:defRPr sz="1400">
+                <a:latin typeface="Courier New" panose="02070309020205020404" pitchFamily="49" charset="0"/>
+                <a:cs typeface="Courier New" panose="02070309020205020404" pitchFamily="49" charset="0"/>
+              </a:defRPr>
+            </a:lvl2pPr>
+          </a:lstStyle>
+          <a:p>
+            <a:r>
+              <a:rPr lang="en-US" dirty="0" err="1"/>
+              <a:t>afterFunction</a:t>
+            </a:r>
+            <a:r>
+              <a:rPr lang="en-US" dirty="0"/>
+              <a:t>(</a:t>
+            </a:r>
+            <a:r>
+              <a:rPr lang="en-US" dirty="0" err="1"/>
+              <a:t>ctx, result</a:t>
+            </a:r>
+            <a:r>
+              <a:rPr lang="en-US" dirty="0"/>
+              <a:t>) </a:t>
+            </a:r>
+          </a:p>
+        </p:txBody>
+      </p:sp>
+      <p:sp>
+        <p:nvSpPr>
+          <p:cNvPr id="33" name="TextBox 32">
+            <a:extLst>
+              <a:ext uri="{FF2B5EF4-FFF2-40B4-BE49-F238E27FC236}">
+                <a16:creationId xmlns:a16="http://schemas.microsoft.com/office/drawing/2014/main" id="{1F193CC9-2C4D-1345-9760-270256B653B3}"/>
+              </a:ext>
+            </a:extLst>
+          </p:cNvPr>
+          <p:cNvSpPr txBox="1"/>
+          <p:nvPr/>
+        </p:nvSpPr>
+        <p:spPr>
+          <a:xfrm flipH="1">
+            <a:off x="2446642" y="5532539"/>
+            <a:ext cx="3071960" cy="307775"/>
+          </a:xfrm>
+          <a:prstGeom prst="rect">
+            <a:avLst/>
+          </a:prstGeom>
+          <a:solidFill>
+            <a:srgbClr val="FFFFFF"/>
+          </a:solidFill>
+          <a:ln w="12700" cap="flat">
+            <a:solidFill>
+              <a:schemeClr val="tx1"/>
+            </a:solidFill>
+            <a:prstDash val="solid"/>
+            <a:miter lim="800000"/>
+          </a:ln>
+          <a:effectLst/>
+          <a:sp3d/>
+        </p:spPr>
+        <p:style>
+          <a:lnRef idx="0">
+            <a:scrgbClr r="0" g="0" b="0"/>
+          </a:lnRef>
+          <a:fillRef idx="0">
+            <a:scrgbClr r="0" g="0" b="0"/>
+          </a:fillRef>
+          <a:effectRef idx="0">
+            <a:scrgbClr r="0" g="0" b="0"/>
+          </a:effectRef>
+          <a:fontRef idx="none"/>
+        </p:style>
+        <p:txBody>
+          <a:bodyPr rot="0" spcFirstLastPara="1" vertOverflow="overflow" horzOverflow="overflow" vert="horz" wrap="square" lIns="144000" tIns="45719" rIns="45719" bIns="45719" numCol="1" spcCol="38100" rtlCol="0" fromWordArt="0" anchor="ctr" anchorCtr="0" forceAA="0" compatLnSpc="1">
+            <a:prstTxWarp prst="textNoShape">
+              <a:avLst/>
+            </a:prstTxWarp>
+            <a:noAutofit/>
+          </a:bodyPr>
+          <a:lstStyle>
+            <a:defPPr marL="0" marR="0" indent="0" algn="l" defTabSz="914400" rtl="0" fontAlgn="auto" latinLnBrk="1" hangingPunct="0">
+              <a:lnSpc>
+                <a:spcPct val="100000"/>
+              </a:lnSpc>
+              <a:spcBef>
+                <a:spcPts val="0"/>
+              </a:spcBef>
+              <a:spcAft>
+                <a:spcPts val="0"/>
+              </a:spcAft>
+              <a:buClrTx/>
+              <a:buSzTx/>
+              <a:buFontTx/>
+              <a:buNone/>
+              <a:tabLst/>
+              <a:defRPr kumimoji="0" sz="1800" b="0" i="0" u="none" strike="noStrike" cap="none" spc="0" normalizeH="0" baseline="0">
+                <a:ln>
+                  <a:noFill/>
+                </a:ln>
+                <a:solidFill>
+                  <a:srgbClr val="000000"/>
+                </a:solidFill>
+                <a:effectLst/>
+                <a:uFillTx/>
+              </a:defRPr>
+            </a:defPPr>
+            <a:lvl1pPr>
+              <a:defRPr sz="1400">
+                <a:latin typeface="Courier New" panose="02070309020205020404" pitchFamily="49" charset="0"/>
+                <a:cs typeface="Courier New" panose="02070309020205020404" pitchFamily="49" charset="0"/>
+              </a:defRPr>
+            </a:lvl1pPr>
+            <a:lvl2pPr lvl="1">
+              <a:defRPr sz="1400">
+                <a:latin typeface="Courier New" panose="02070309020205020404" pitchFamily="49" charset="0"/>
+                <a:cs typeface="Courier New" panose="02070309020205020404" pitchFamily="49" charset="0"/>
+              </a:defRPr>
+            </a:lvl2pPr>
+          </a:lstStyle>
+          <a:p>
+            <a:r>
+              <a:rPr lang="en-US" dirty="0" err="1"/>
+              <a:t>unknownFunction</a:t>
+            </a:r>
+            <a:r>
+              <a:rPr lang="en-US" dirty="0"/>
+              <a:t>(</a:t>
+            </a:r>
+            <a:r>
+              <a:rPr lang="en-US" dirty="0" err="1"/>
+              <a:t>ctx</a:t>
+            </a:r>
+            <a:r>
+              <a:rPr lang="en-US" dirty="0"/>
+              <a:t>) </a:t>
+            </a:r>
+          </a:p>
+        </p:txBody>
+      </p:sp>
+      <p:cxnSp>
+        <p:nvCxnSpPr>
+          <p:cNvPr id="63" name="Straight Arrow Connector 62">
+            <a:extLst>
+              <a:ext uri="{FF2B5EF4-FFF2-40B4-BE49-F238E27FC236}">
+                <a16:creationId xmlns:a16="http://schemas.microsoft.com/office/drawing/2014/main" id="{CEDC5530-F0B0-3146-A2CF-65DBCE8CC7A0}"/>
+              </a:ext>
+            </a:extLst>
+          </p:cNvPr>
+          <p:cNvCxnSpPr>
+            <a:cxnSpLocks/>
+            <a:stCxn id="33" idx="1"/>
+          </p:cNvCxnSpPr>
+          <p:nvPr/>
+        </p:nvCxnSpPr>
+        <p:spPr>
+          <a:xfrm>
+            <a:off x="5518602" y="5686427"/>
+            <a:ext cx="345987" cy="0"/>
+          </a:xfrm>
+          <a:prstGeom prst="straightConnector1">
+            <a:avLst/>
+          </a:prstGeom>
+          <a:noFill/>
+          <a:ln w="12700" cap="flat">
+            <a:solidFill>
+              <a:schemeClr val="tx1"/>
+            </a:solidFill>
+            <a:prstDash val="solid"/>
+            <a:miter lim="800000"/>
+            <a:headEnd type="triangle"/>
+            <a:tailEnd type="none"/>
+          </a:ln>
+          <a:effectLst/>
+          <a:sp3d/>
+        </p:spPr>
+        <p:style>
+          <a:lnRef idx="0">
+            <a:scrgbClr r="0" g="0" b="0"/>
+          </a:lnRef>
+          <a:fillRef idx="0">
+            <a:scrgbClr r="0" g="0" b="0"/>
+          </a:fillRef>
+          <a:effectRef idx="0">
+            <a:scrgbClr r="0" g="0" b="0"/>
+          </a:effectRef>
+          <a:fontRef idx="none"/>
+        </p:style>
+      </p:cxnSp>
+      <p:grpSp>
+        <p:nvGrpSpPr>
+          <p:cNvPr id="18" name="Group 17">
+            <a:extLst>
+              <a:ext uri="{FF2B5EF4-FFF2-40B4-BE49-F238E27FC236}">
+                <a16:creationId xmlns:a16="http://schemas.microsoft.com/office/drawing/2014/main" id="{6EB9AA1B-EC21-0941-B4D3-585A25046AFD}"/>
+              </a:ext>
+            </a:extLst>
+          </p:cNvPr>
+          <p:cNvGrpSpPr/>
+          <p:nvPr/>
+        </p:nvGrpSpPr>
+        <p:grpSpPr>
+          <a:xfrm>
+            <a:off x="2095893" y="2695242"/>
+            <a:ext cx="350750" cy="2991185"/>
+            <a:chOff x="1835991" y="2695242"/>
+            <a:chExt cx="565298" cy="2991185"/>
+          </a:xfrm>
+        </p:grpSpPr>
+        <p:cxnSp>
+          <p:nvCxnSpPr>
+            <p:cNvPr id="56" name="Straight Arrow Connector 55">
+              <a:extLst>
+                <a:ext uri="{FF2B5EF4-FFF2-40B4-BE49-F238E27FC236}">
+                  <a16:creationId xmlns:a16="http://schemas.microsoft.com/office/drawing/2014/main" id="{1129EF10-82D5-7E49-8419-32B332509B04}"/>
+                </a:ext>
+              </a:extLst>
+            </p:cNvPr>
+            <p:cNvCxnSpPr>
+              <a:cxnSpLocks/>
+              <a:endCxn id="5" idx="3"/>
+            </p:cNvCxnSpPr>
+            <p:nvPr/>
+          </p:nvCxnSpPr>
+          <p:spPr>
+            <a:xfrm>
+              <a:off x="1835991" y="2695242"/>
+              <a:ext cx="565298" cy="0"/>
+            </a:xfrm>
+            <a:prstGeom prst="straightConnector1">
+              <a:avLst/>
+            </a:prstGeom>
+            <a:noFill/>
+            <a:ln w="12700" cap="flat">
+              <a:solidFill>
+                <a:schemeClr val="tx1"/>
+              </a:solidFill>
+              <a:prstDash val="solid"/>
+              <a:miter lim="800000"/>
+              <a:tailEnd type="triangle"/>
+            </a:ln>
+            <a:effectLst/>
+            <a:sp3d/>
+          </p:spPr>
+          <p:style>
+            <a:lnRef idx="0">
+              <a:scrgbClr r="0" g="0" b="0"/>
+            </a:lnRef>
+            <a:fillRef idx="0">
+              <a:scrgbClr r="0" g="0" b="0"/>
+            </a:fillRef>
+            <a:effectRef idx="0">
+              <a:scrgbClr r="0" g="0" b="0"/>
+            </a:effectRef>
+            <a:fontRef idx="none"/>
+          </p:style>
+        </p:cxnSp>
+        <p:cxnSp>
+          <p:nvCxnSpPr>
+            <p:cNvPr id="57" name="Straight Arrow Connector 56">
+              <a:extLst>
+                <a:ext uri="{FF2B5EF4-FFF2-40B4-BE49-F238E27FC236}">
+                  <a16:creationId xmlns:a16="http://schemas.microsoft.com/office/drawing/2014/main" id="{1092D832-3806-DD4F-888E-56A4B1615CF5}"/>
+                </a:ext>
+              </a:extLst>
+            </p:cNvPr>
+            <p:cNvCxnSpPr>
+              <a:cxnSpLocks/>
+              <a:endCxn id="32" idx="3"/>
+            </p:cNvCxnSpPr>
+            <p:nvPr/>
+          </p:nvCxnSpPr>
+          <p:spPr>
+            <a:xfrm>
+              <a:off x="1835991" y="3332571"/>
+              <a:ext cx="565297" cy="0"/>
+            </a:xfrm>
+            <a:prstGeom prst="straightConnector1">
+              <a:avLst/>
+            </a:prstGeom>
+            <a:noFill/>
+            <a:ln w="12700" cap="flat">
+              <a:solidFill>
+                <a:schemeClr val="tx1"/>
+              </a:solidFill>
+              <a:prstDash val="solid"/>
+              <a:miter lim="800000"/>
+              <a:headEnd type="triangle"/>
+              <a:tailEnd type="none"/>
+            </a:ln>
+            <a:effectLst/>
+            <a:sp3d/>
+          </p:spPr>
+          <p:style>
+            <a:lnRef idx="0">
+              <a:scrgbClr r="0" g="0" b="0"/>
+            </a:lnRef>
+            <a:fillRef idx="0">
+              <a:scrgbClr r="0" g="0" b="0"/>
+            </a:fillRef>
+            <a:effectRef idx="0">
+              <a:scrgbClr r="0" g="0" b="0"/>
+            </a:effectRef>
+            <a:fontRef idx="none"/>
+          </p:style>
+        </p:cxnSp>
+        <p:cxnSp>
+          <p:nvCxnSpPr>
+            <p:cNvPr id="66" name="Straight Arrow Connector 65">
+              <a:extLst>
+                <a:ext uri="{FF2B5EF4-FFF2-40B4-BE49-F238E27FC236}">
+                  <a16:creationId xmlns:a16="http://schemas.microsoft.com/office/drawing/2014/main" id="{83577554-4CCF-1D4C-A504-0E5E5EF70C32}"/>
+                </a:ext>
+              </a:extLst>
+            </p:cNvPr>
+            <p:cNvCxnSpPr>
+              <a:cxnSpLocks/>
+              <a:endCxn id="33" idx="3"/>
+            </p:cNvCxnSpPr>
+            <p:nvPr/>
+          </p:nvCxnSpPr>
+          <p:spPr>
+            <a:xfrm>
+              <a:off x="1835991" y="5686427"/>
+              <a:ext cx="565297" cy="0"/>
+            </a:xfrm>
+            <a:prstGeom prst="straightConnector1">
+              <a:avLst/>
+            </a:prstGeom>
+            <a:noFill/>
+            <a:ln w="12700" cap="flat">
+              <a:solidFill>
+                <a:schemeClr val="tx1"/>
+              </a:solidFill>
+              <a:prstDash val="solid"/>
+              <a:miter lim="800000"/>
+              <a:headEnd type="triangle"/>
+              <a:tailEnd type="none"/>
+            </a:ln>
+            <a:effectLst/>
+            <a:sp3d/>
+          </p:spPr>
+          <p:style>
+            <a:lnRef idx="0">
+              <a:scrgbClr r="0" g="0" b="0"/>
+            </a:lnRef>
+            <a:fillRef idx="0">
+              <a:scrgbClr r="0" g="0" b="0"/>
+            </a:fillRef>
+            <a:effectRef idx="0">
+              <a:scrgbClr r="0" g="0" b="0"/>
+            </a:effectRef>
+            <a:fontRef idx="none"/>
+          </p:style>
+        </p:cxnSp>
+      </p:grpSp>
+    </p:spTree>
+    <p:extLst>
+      <p:ext uri="{BB962C8B-B14F-4D97-AF65-F5344CB8AC3E}">
+        <p14:creationId xmlns:p14="http://schemas.microsoft.com/office/powerpoint/2010/main" val="1665966719"/>
+      </p:ext>
+    </p:extLst>
+  </p:cSld>
+  <p:clrMapOvr>
+    <a:masterClrMapping/>
+  </p:clrMapOvr>
+  <p:transition spd="med"/>
+</p:sld>
+</file>
+
+<file path=ppt/slides/slide5.xml><?xml version="1.0" encoding="utf-8"?>
+<p:sld xmlns:a="http://schemas.openxmlformats.org/drawingml/2006/main" xmlns:r="http://schemas.openxmlformats.org/officeDocument/2006/relationships" xmlns:p="http://schemas.openxmlformats.org/presentationml/2006/main">
+  <p:cSld>
+    <p:spTree>
+      <p:nvGrpSpPr>
+        <p:cNvPr id="1" name=""/>
+        <p:cNvGrpSpPr/>
+        <p:nvPr/>
+      </p:nvGrpSpPr>
+      <p:grpSpPr>
+        <a:xfrm>
+          <a:off x="0" y="0"/>
+          <a:ext cx="0" cy="0"/>
+          <a:chOff x="0" y="0"/>
+          <a:chExt cx="0" cy="0"/>
+        </a:xfrm>
+      </p:grpSpPr>
+      <p:sp>
+        <p:nvSpPr>
+          <p:cNvPr id="6" name="Rectangle 28">
+            <a:extLst>
+              <a:ext uri="{FF2B5EF4-FFF2-40B4-BE49-F238E27FC236}">
+                <a16:creationId xmlns:a16="http://schemas.microsoft.com/office/drawing/2014/main" id="{F83AD13B-686A-7441-AF80-1AAF66037A2E}"/>
+              </a:ext>
+            </a:extLst>
+          </p:cNvPr>
+          <p:cNvSpPr/>
+          <p:nvPr/>
+        </p:nvSpPr>
+        <p:spPr>
+          <a:xfrm>
+            <a:off x="1956378" y="1921239"/>
+            <a:ext cx="8943280" cy="4084819"/>
+          </a:xfrm>
+          <a:prstGeom prst="rect">
+            <a:avLst/>
+          </a:prstGeom>
+          <a:ln w="12700">
+            <a:solidFill>
+              <a:schemeClr val="tx1"/>
+            </a:solidFill>
+            <a:miter/>
+          </a:ln>
+        </p:spPr>
+        <p:txBody>
+          <a:bodyPr lIns="45719" rIns="45719" anchor="ctr"/>
+          <a:lstStyle/>
+          <a:p>
+            <a:pPr algn="ctr">
+              <a:defRPr>
+                <a:solidFill>
+                  <a:srgbClr val="FFFFFF"/>
+                </a:solidFill>
+              </a:defRPr>
+            </a:pPr>
+            <a:endParaRPr/>
+          </a:p>
+        </p:txBody>
+      </p:sp>
+      <p:sp>
+        <p:nvSpPr>
+          <p:cNvPr id="7" name="Title 4">
+            <a:extLst>
+              <a:ext uri="{FF2B5EF4-FFF2-40B4-BE49-F238E27FC236}">
+                <a16:creationId xmlns:a16="http://schemas.microsoft.com/office/drawing/2014/main" id="{5FBE3801-AF81-B14D-A087-3503F478758D}"/>
+              </a:ext>
+            </a:extLst>
+          </p:cNvPr>
+          <p:cNvSpPr txBox="1">
+            <a:spLocks/>
+          </p:cNvSpPr>
+          <p:nvPr/>
+        </p:nvSpPr>
+        <p:spPr>
+          <a:xfrm>
+            <a:off x="990600" y="517525"/>
+            <a:ext cx="10515600" cy="1325563"/>
+          </a:xfrm>
+          <a:prstGeom prst="rect">
+            <a:avLst/>
+          </a:prstGeom>
+          <a:ln w="12700">
+            <a:miter lim="400000"/>
+          </a:ln>
+          <a:extLst>
+            <a:ext uri="{C572A759-6A51-4108-AA02-DFA0A04FC94B}">
+              <ma14:wrappingTextBoxFlag xmlns="" xmlns:ma14="http://schemas.microsoft.com/office/mac/drawingml/2011/main" val="1"/>
+            </a:ext>
+          </a:extLst>
+        </p:spPr>
+        <p:txBody>
+          <a:bodyPr lIns="45719" rIns="45719" anchor="ctr">
+            <a:normAutofit/>
+          </a:bodyPr>
+          <a:lstStyle>
+            <a:lvl1pPr marL="0" marR="0" indent="0" algn="l" defTabSz="914400" rtl="0" latinLnBrk="0">
+              <a:lnSpc>
+                <a:spcPct val="90000"/>
+              </a:lnSpc>
+              <a:spcBef>
+                <a:spcPts val="0"/>
+              </a:spcBef>
+              <a:spcAft>
+                <a:spcPts val="0"/>
+              </a:spcAft>
+              <a:buClrTx/>
+              <a:buSzTx/>
+              <a:buFontTx/>
+              <a:buNone/>
+              <a:tabLst/>
+              <a:defRPr sz="4400" b="0" i="0" u="none" strike="noStrike" cap="none" spc="0" baseline="0">
+                <a:ln>
+                  <a:noFill/>
+                </a:ln>
+                <a:solidFill>
+                  <a:srgbClr val="000000"/>
+                </a:solidFill>
+                <a:uFillTx/>
+                <a:latin typeface="Calibri Light"/>
+                <a:ea typeface="Calibri Light"/>
+                <a:cs typeface="Calibri Light"/>
+                <a:sym typeface="Calibri Light"/>
+              </a:defRPr>
+            </a:lvl1pPr>
+            <a:lvl2pPr marL="0" marR="0" indent="0" algn="l" defTabSz="914400" rtl="0" latinLnBrk="0">
+              <a:lnSpc>
+                <a:spcPct val="90000"/>
+              </a:lnSpc>
+              <a:spcBef>
+                <a:spcPts val="0"/>
+              </a:spcBef>
+              <a:spcAft>
+                <a:spcPts val="0"/>
+              </a:spcAft>
+              <a:buClrTx/>
+              <a:buSzTx/>
+              <a:buFontTx/>
+              <a:buNone/>
+              <a:tabLst/>
+              <a:defRPr sz="4400" b="0" i="0" u="none" strike="noStrike" cap="none" spc="0" baseline="0">
+                <a:ln>
+                  <a:noFill/>
+                </a:ln>
+                <a:solidFill>
+                  <a:srgbClr val="000000"/>
+                </a:solidFill>
+                <a:uFillTx/>
+                <a:latin typeface="Calibri Light"/>
+                <a:ea typeface="Calibri Light"/>
+                <a:cs typeface="Calibri Light"/>
+                <a:sym typeface="Calibri Light"/>
+              </a:defRPr>
+            </a:lvl2pPr>
+            <a:lvl3pPr marL="0" marR="0" indent="0" algn="l" defTabSz="914400" rtl="0" latinLnBrk="0">
+              <a:lnSpc>
+                <a:spcPct val="90000"/>
+              </a:lnSpc>
+              <a:spcBef>
+                <a:spcPts val="0"/>
+              </a:spcBef>
+              <a:spcAft>
+                <a:spcPts val="0"/>
+              </a:spcAft>
+              <a:buClrTx/>
+              <a:buSzTx/>
+              <a:buFontTx/>
+              <a:buNone/>
+              <a:tabLst/>
+              <a:defRPr sz="4400" b="0" i="0" u="none" strike="noStrike" cap="none" spc="0" baseline="0">
+                <a:ln>
+                  <a:noFill/>
+                </a:ln>
+                <a:solidFill>
+                  <a:srgbClr val="000000"/>
+                </a:solidFill>
+                <a:uFillTx/>
+                <a:latin typeface="Calibri Light"/>
+                <a:ea typeface="Calibri Light"/>
+                <a:cs typeface="Calibri Light"/>
+                <a:sym typeface="Calibri Light"/>
+              </a:defRPr>
+            </a:lvl3pPr>
+            <a:lvl4pPr marL="0" marR="0" indent="0" algn="l" defTabSz="914400" rtl="0" latinLnBrk="0">
+              <a:lnSpc>
+                <a:spcPct val="90000"/>
+              </a:lnSpc>
+              <a:spcBef>
+                <a:spcPts val="0"/>
+              </a:spcBef>
+              <a:spcAft>
+                <a:spcPts val="0"/>
+              </a:spcAft>
+              <a:buClrTx/>
+              <a:buSzTx/>
+              <a:buFontTx/>
+              <a:buNone/>
+              <a:tabLst/>
+              <a:defRPr sz="4400" b="0" i="0" u="none" strike="noStrike" cap="none" spc="0" baseline="0">
+                <a:ln>
+                  <a:noFill/>
+                </a:ln>
+                <a:solidFill>
+                  <a:srgbClr val="000000"/>
+                </a:solidFill>
+                <a:uFillTx/>
+                <a:latin typeface="Calibri Light"/>
+                <a:ea typeface="Calibri Light"/>
+                <a:cs typeface="Calibri Light"/>
+                <a:sym typeface="Calibri Light"/>
+              </a:defRPr>
+            </a:lvl4pPr>
+            <a:lvl5pPr marL="0" marR="0" indent="0" algn="l" defTabSz="914400" rtl="0" latinLnBrk="0">
+              <a:lnSpc>
+                <a:spcPct val="90000"/>
+              </a:lnSpc>
+              <a:spcBef>
+                <a:spcPts val="0"/>
+              </a:spcBef>
+              <a:spcAft>
+                <a:spcPts val="0"/>
+              </a:spcAft>
+              <a:buClrTx/>
+              <a:buSzTx/>
+              <a:buFontTx/>
+              <a:buNone/>
+              <a:tabLst/>
+              <a:defRPr sz="4400" b="0" i="0" u="none" strike="noStrike" cap="none" spc="0" baseline="0">
+                <a:ln>
+                  <a:noFill/>
+                </a:ln>
+                <a:solidFill>
+                  <a:srgbClr val="000000"/>
+                </a:solidFill>
+                <a:uFillTx/>
+                <a:latin typeface="Calibri Light"/>
+                <a:ea typeface="Calibri Light"/>
+                <a:cs typeface="Calibri Light"/>
+                <a:sym typeface="Calibri Light"/>
+              </a:defRPr>
+            </a:lvl5pPr>
+            <a:lvl6pPr marL="0" marR="0" indent="0" algn="l" defTabSz="914400" rtl="0" latinLnBrk="0">
+              <a:lnSpc>
+                <a:spcPct val="90000"/>
+              </a:lnSpc>
+              <a:spcBef>
+                <a:spcPts val="0"/>
+              </a:spcBef>
+              <a:spcAft>
+                <a:spcPts val="0"/>
+              </a:spcAft>
+              <a:buClrTx/>
+              <a:buSzTx/>
+              <a:buFontTx/>
+              <a:buNone/>
+              <a:tabLst/>
+              <a:defRPr sz="4400" b="0" i="0" u="none" strike="noStrike" cap="none" spc="0" baseline="0">
+                <a:ln>
+                  <a:noFill/>
+                </a:ln>
+                <a:solidFill>
+                  <a:srgbClr val="000000"/>
+                </a:solidFill>
+                <a:uFillTx/>
+                <a:latin typeface="Calibri Light"/>
+                <a:ea typeface="Calibri Light"/>
+                <a:cs typeface="Calibri Light"/>
+                <a:sym typeface="Calibri Light"/>
+              </a:defRPr>
+            </a:lvl6pPr>
+            <a:lvl7pPr marL="0" marR="0" indent="0" algn="l" defTabSz="914400" rtl="0" latinLnBrk="0">
+              <a:lnSpc>
+                <a:spcPct val="90000"/>
+              </a:lnSpc>
+              <a:spcBef>
+                <a:spcPts val="0"/>
+              </a:spcBef>
+              <a:spcAft>
+                <a:spcPts val="0"/>
+              </a:spcAft>
+              <a:buClrTx/>
+              <a:buSzTx/>
+              <a:buFontTx/>
+              <a:buNone/>
+              <a:tabLst/>
+              <a:defRPr sz="4400" b="0" i="0" u="none" strike="noStrike" cap="none" spc="0" baseline="0">
+                <a:ln>
+                  <a:noFill/>
+                </a:ln>
+                <a:solidFill>
+                  <a:srgbClr val="000000"/>
+                </a:solidFill>
+                <a:uFillTx/>
+                <a:latin typeface="Calibri Light"/>
+                <a:ea typeface="Calibri Light"/>
+                <a:cs typeface="Calibri Light"/>
+                <a:sym typeface="Calibri Light"/>
+              </a:defRPr>
+            </a:lvl7pPr>
+            <a:lvl8pPr marL="0" marR="0" indent="0" algn="l" defTabSz="914400" rtl="0" latinLnBrk="0">
+              <a:lnSpc>
+                <a:spcPct val="90000"/>
+              </a:lnSpc>
+              <a:spcBef>
+                <a:spcPts val="0"/>
+              </a:spcBef>
+              <a:spcAft>
+                <a:spcPts val="0"/>
+              </a:spcAft>
+              <a:buClrTx/>
+              <a:buSzTx/>
+              <a:buFontTx/>
+              <a:buNone/>
+              <a:tabLst/>
+              <a:defRPr sz="4400" b="0" i="0" u="none" strike="noStrike" cap="none" spc="0" baseline="0">
+                <a:ln>
+                  <a:noFill/>
+                </a:ln>
+                <a:solidFill>
+                  <a:srgbClr val="000000"/>
+                </a:solidFill>
+                <a:uFillTx/>
+                <a:latin typeface="Calibri Light"/>
+                <a:ea typeface="Calibri Light"/>
+                <a:cs typeface="Calibri Light"/>
+                <a:sym typeface="Calibri Light"/>
+              </a:defRPr>
+            </a:lvl8pPr>
+            <a:lvl9pPr marL="0" marR="0" indent="0" algn="l" defTabSz="914400" rtl="0" latinLnBrk="0">
+              <a:lnSpc>
+                <a:spcPct val="90000"/>
+              </a:lnSpc>
+              <a:spcBef>
+                <a:spcPts val="0"/>
+              </a:spcBef>
+              <a:spcAft>
+                <a:spcPts val="0"/>
+              </a:spcAft>
+              <a:buClrTx/>
+              <a:buSzTx/>
+              <a:buFontTx/>
+              <a:buNone/>
+              <a:tabLst/>
+              <a:defRPr sz="4400" b="0" i="0" u="none" strike="noStrike" cap="none" spc="0" baseline="0">
+                <a:ln>
+                  <a:noFill/>
+                </a:ln>
+                <a:solidFill>
+                  <a:srgbClr val="000000"/>
+                </a:solidFill>
+                <a:uFillTx/>
+                <a:latin typeface="Calibri Light"/>
+                <a:ea typeface="Calibri Light"/>
+                <a:cs typeface="Calibri Light"/>
+                <a:sym typeface="Calibri Light"/>
+              </a:defRPr>
+            </a:lvl9pPr>
+          </a:lstStyle>
+          <a:p>
+            <a:pPr hangingPunct="1"/>
+            <a:r>
+              <a:rPr lang="en-US" sz="3600" dirty="0"/>
               <a:t>Diagram 3 – Application Structure</a:t>
             </a:r>
           </a:p>
@@ -7117,7 +8532,7 @@
 </p:sld>
 </file>
 
-<file path=ppt/slides/slide5.xml><?xml version="1.0" encoding="utf-8"?>
+<file path=ppt/slides/slide6.xml><?xml version="1.0" encoding="utf-8"?>
 <p:sld xmlns:a="http://schemas.openxmlformats.org/drawingml/2006/main" xmlns:r="http://schemas.openxmlformats.org/officeDocument/2006/relationships" xmlns:p="http://schemas.openxmlformats.org/presentationml/2006/main">
   <p:cSld>
     <p:spTree>

</xml_diff>